<commit_message>
updated after model sample review
</commit_message>
<xml_diff>
--- a/Task 1-Exploratory Data Analysis (Mandatory Task)_Presentation.pptx
+++ b/Task 1-Exploratory Data Analysis (Mandatory Task)_Presentation.pptx
@@ -8,10 +8,10 @@
     <p:sldMasterId id="2147483862" r:id="rId4"/>
   </p:sldMasterIdLst>
   <p:notesMasterIdLst>
-    <p:notesMasterId r:id="rId12"/>
+    <p:notesMasterId r:id="rId13"/>
   </p:notesMasterIdLst>
   <p:handoutMasterIdLst>
-    <p:handoutMasterId r:id="rId13"/>
+    <p:handoutMasterId r:id="rId14"/>
   </p:handoutMasterIdLst>
   <p:sldIdLst>
     <p:sldId id="417" r:id="rId5"/>
@@ -21,6 +21,7 @@
     <p:sldId id="449" r:id="rId9"/>
     <p:sldId id="448" r:id="rId10"/>
     <p:sldId id="450" r:id="rId11"/>
+    <p:sldId id="451" r:id="rId12"/>
   </p:sldIdLst>
   <p:sldSz cx="9144000" cy="6858000" type="screen4x3"/>
   <p:notesSz cx="6858000" cy="9144000"/>
@@ -131,6 +132,7 @@
             <p14:sldId id="449"/>
             <p14:sldId id="448"/>
             <p14:sldId id="450"/>
+            <p14:sldId id="451"/>
           </p14:sldIdLst>
         </p14:section>
         <p14:section name="CREDITS &amp; COPYRIGHTS" id="{A11DE2D7-8506-4D4C-9DA4-C8ABD28C7139}">
@@ -151,7 +153,7 @@
 <file path=ppt/revisionInfo.xml><?xml version="1.0" encoding="utf-8"?>
 <p1510:revInfo xmlns:a="http://schemas.openxmlformats.org/drawingml/2006/main" xmlns:r="http://schemas.openxmlformats.org/officeDocument/2006/relationships" xmlns:p1510="http://schemas.microsoft.com/office/powerpoint/2015/10/main">
   <p1510:revLst>
-    <p1510:client id="{3D9846B6-E99C-44D7-8A6F-14EB01E0FCF5}" v="13" dt="2022-09-10T23:42:16.217"/>
+    <p1510:client id="{3D9846B6-E99C-44D7-8A6F-14EB01E0FCF5}" v="20" dt="2022-09-17T17:59:43.084"/>
   </p1510:revLst>
 </p1510:revInfo>
 </file>
@@ -161,7 +163,7 @@
   <pc:docChgLst>
     <pc:chgData name="Diekrons MCL" userId="b6f93fc8970d2d55" providerId="LiveId" clId="{3D9846B6-E99C-44D7-8A6F-14EB01E0FCF5}"/>
     <pc:docChg chg="undo redo custSel addSld delSld modSld sldOrd modMainMaster modSection">
-      <pc:chgData name="Diekrons MCL" userId="b6f93fc8970d2d55" providerId="LiveId" clId="{3D9846B6-E99C-44D7-8A6F-14EB01E0FCF5}" dt="2022-09-11T00:16:57.272" v="2209" actId="2711"/>
+      <pc:chgData name="Diekrons MCL" userId="b6f93fc8970d2d55" providerId="LiveId" clId="{3D9846B6-E99C-44D7-8A6F-14EB01E0FCF5}" dt="2022-09-17T18:00:13.806" v="2650" actId="20577"/>
       <pc:docMkLst>
         <pc:docMk/>
       </pc:docMkLst>
@@ -830,11 +832,19 @@
         </pc:picChg>
       </pc:sldChg>
       <pc:sldChg chg="addSp delSp modSp add mod">
-        <pc:chgData name="Diekrons MCL" userId="b6f93fc8970d2d55" providerId="LiveId" clId="{3D9846B6-E99C-44D7-8A6F-14EB01E0FCF5}" dt="2022-09-11T00:16:38.104" v="2208" actId="2711"/>
+        <pc:chgData name="Diekrons MCL" userId="b6f93fc8970d2d55" providerId="LiveId" clId="{3D9846B6-E99C-44D7-8A6F-14EB01E0FCF5}" dt="2022-09-17T18:00:13.806" v="2650" actId="20577"/>
         <pc:sldMkLst>
           <pc:docMk/>
           <pc:sldMk cId="3408084735" sldId="448"/>
         </pc:sldMkLst>
+        <pc:spChg chg="add mod">
+          <ac:chgData name="Diekrons MCL" userId="b6f93fc8970d2d55" providerId="LiveId" clId="{3D9846B6-E99C-44D7-8A6F-14EB01E0FCF5}" dt="2022-09-17T17:59:43.084" v="2616"/>
+          <ac:spMkLst>
+            <pc:docMk/>
+            <pc:sldMk cId="3408084735" sldId="448"/>
+            <ac:spMk id="3" creationId="{4B299F21-B66D-C3FE-9B78-976ECCF04C9F}"/>
+          </ac:spMkLst>
+        </pc:spChg>
         <pc:spChg chg="add del mod">
           <ac:chgData name="Diekrons MCL" userId="b6f93fc8970d2d55" providerId="LiveId" clId="{3D9846B6-E99C-44D7-8A6F-14EB01E0FCF5}" dt="2022-09-10T23:32:38.975" v="1455" actId="478"/>
           <ac:spMkLst>
@@ -924,13 +934,21 @@
           </ac:spMkLst>
         </pc:spChg>
         <pc:spChg chg="add mod">
-          <ac:chgData name="Diekrons MCL" userId="b6f93fc8970d2d55" providerId="LiveId" clId="{3D9846B6-E99C-44D7-8A6F-14EB01E0FCF5}" dt="2022-09-11T00:10:21.658" v="2034" actId="1076"/>
+          <ac:chgData name="Diekrons MCL" userId="b6f93fc8970d2d55" providerId="LiveId" clId="{3D9846B6-E99C-44D7-8A6F-14EB01E0FCF5}" dt="2022-09-17T18:00:13.806" v="2650" actId="20577"/>
           <ac:spMkLst>
             <pc:docMk/>
             <pc:sldMk cId="3408084735" sldId="448"/>
             <ac:spMk id="39" creationId="{1BC327FA-1A43-8DA6-68D4-511C7834800C}"/>
           </ac:spMkLst>
         </pc:spChg>
+        <pc:picChg chg="add mod">
+          <ac:chgData name="Diekrons MCL" userId="b6f93fc8970d2d55" providerId="LiveId" clId="{3D9846B6-E99C-44D7-8A6F-14EB01E0FCF5}" dt="2022-09-17T17:59:56.003" v="2618" actId="1076"/>
+          <ac:picMkLst>
+            <pc:docMk/>
+            <pc:sldMk cId="3408084735" sldId="448"/>
+            <ac:picMk id="2" creationId="{2FA90880-8090-5BB2-4745-5E3BAA90B1E5}"/>
+          </ac:picMkLst>
+        </pc:picChg>
         <pc:picChg chg="add mod">
           <ac:chgData name="Diekrons MCL" userId="b6f93fc8970d2d55" providerId="LiveId" clId="{3D9846B6-E99C-44D7-8A6F-14EB01E0FCF5}" dt="2022-09-10T23:34:46.696" v="1531" actId="1076"/>
           <ac:picMkLst>
@@ -996,7 +1014,7 @@
           </ac:picMkLst>
         </pc:picChg>
         <pc:picChg chg="add mod">
-          <ac:chgData name="Diekrons MCL" userId="b6f93fc8970d2d55" providerId="LiveId" clId="{3D9846B6-E99C-44D7-8A6F-14EB01E0FCF5}" dt="2022-09-11T00:10:21.658" v="2034" actId="1076"/>
+          <ac:chgData name="Diekrons MCL" userId="b6f93fc8970d2d55" providerId="LiveId" clId="{3D9846B6-E99C-44D7-8A6F-14EB01E0FCF5}" dt="2022-09-17T17:58:52.790" v="2611" actId="1076"/>
           <ac:picMkLst>
             <pc:docMk/>
             <pc:sldMk cId="3408084735" sldId="448"/>
@@ -1076,11 +1094,19 @@
         </pc:picChg>
       </pc:sldChg>
       <pc:sldChg chg="addSp delSp modSp add mod">
-        <pc:chgData name="Diekrons MCL" userId="b6f93fc8970d2d55" providerId="LiveId" clId="{3D9846B6-E99C-44D7-8A6F-14EB01E0FCF5}" dt="2022-09-11T00:16:57.272" v="2209" actId="2711"/>
+        <pc:chgData name="Diekrons MCL" userId="b6f93fc8970d2d55" providerId="LiveId" clId="{3D9846B6-E99C-44D7-8A6F-14EB01E0FCF5}" dt="2022-09-17T17:58:00.925" v="2607" actId="1076"/>
         <pc:sldMkLst>
           <pc:docMk/>
           <pc:sldMk cId="1438842662" sldId="450"/>
         </pc:sldMkLst>
+        <pc:spChg chg="add mod">
+          <ac:chgData name="Diekrons MCL" userId="b6f93fc8970d2d55" providerId="LiveId" clId="{3D9846B6-E99C-44D7-8A6F-14EB01E0FCF5}" dt="2022-09-17T17:57:52.739" v="2606" actId="20577"/>
+          <ac:spMkLst>
+            <pc:docMk/>
+            <pc:sldMk cId="1438842662" sldId="450"/>
+            <ac:spMk id="5" creationId="{6C6A7D5A-F389-F12B-90FB-488765BA5CDC}"/>
+          </ac:spMkLst>
+        </pc:spChg>
         <pc:spChg chg="mod">
           <ac:chgData name="Diekrons MCL" userId="b6f93fc8970d2d55" providerId="LiveId" clId="{3D9846B6-E99C-44D7-8A6F-14EB01E0FCF5}" dt="2022-09-11T00:16:57.272" v="2209" actId="2711"/>
           <ac:spMkLst>
@@ -1089,12 +1115,20 @@
             <ac:spMk id="7" creationId="{00000000-0000-0000-0000-000000000000}"/>
           </ac:spMkLst>
         </pc:spChg>
-        <pc:spChg chg="add mod">
-          <ac:chgData name="Diekrons MCL" userId="b6f93fc8970d2d55" providerId="LiveId" clId="{3D9846B6-E99C-44D7-8A6F-14EB01E0FCF5}" dt="2022-09-11T00:11:45.070" v="2048" actId="120"/>
+        <pc:spChg chg="add del mod">
+          <ac:chgData name="Diekrons MCL" userId="b6f93fc8970d2d55" providerId="LiveId" clId="{3D9846B6-E99C-44D7-8A6F-14EB01E0FCF5}" dt="2022-09-17T17:51:51.813" v="2212" actId="478"/>
           <ac:spMkLst>
             <pc:docMk/>
             <pc:sldMk cId="1438842662" sldId="450"/>
             <ac:spMk id="8" creationId="{9D8CA09A-93E4-EAC9-5607-276AA7A25052}"/>
+          </ac:spMkLst>
+        </pc:spChg>
+        <pc:spChg chg="add mod">
+          <ac:chgData name="Diekrons MCL" userId="b6f93fc8970d2d55" providerId="LiveId" clId="{3D9846B6-E99C-44D7-8A6F-14EB01E0FCF5}" dt="2022-09-17T17:57:25.287" v="2558" actId="20577"/>
+          <ac:spMkLst>
+            <pc:docMk/>
+            <pc:sldMk cId="1438842662" sldId="450"/>
+            <ac:spMk id="9" creationId="{5403F228-96D6-BE77-1B7F-80DA58A5C160}"/>
           </ac:spMkLst>
         </pc:spChg>
         <pc:spChg chg="del mod">
@@ -1106,7 +1140,7 @@
           </ac:spMkLst>
         </pc:spChg>
         <pc:spChg chg="add mod">
-          <ac:chgData name="Diekrons MCL" userId="b6f93fc8970d2d55" providerId="LiveId" clId="{3D9846B6-E99C-44D7-8A6F-14EB01E0FCF5}" dt="2022-09-11T00:10:38.121" v="2036" actId="1076"/>
+          <ac:chgData name="Diekrons MCL" userId="b6f93fc8970d2d55" providerId="LiveId" clId="{3D9846B6-E99C-44D7-8A6F-14EB01E0FCF5}" dt="2022-09-17T17:57:01.088" v="2536" actId="6549"/>
           <ac:spMkLst>
             <pc:docMk/>
             <pc:sldMk cId="1438842662" sldId="450"/>
@@ -1122,7 +1156,7 @@
           </ac:spMkLst>
         </pc:spChg>
         <pc:spChg chg="add mod">
-          <ac:chgData name="Diekrons MCL" userId="b6f93fc8970d2d55" providerId="LiveId" clId="{3D9846B6-E99C-44D7-8A6F-14EB01E0FCF5}" dt="2022-09-11T00:14:17.117" v="2197" actId="20577"/>
+          <ac:chgData name="Diekrons MCL" userId="b6f93fc8970d2d55" providerId="LiveId" clId="{3D9846B6-E99C-44D7-8A6F-14EB01E0FCF5}" dt="2022-09-17T17:58:00.925" v="2607" actId="1076"/>
           <ac:spMkLst>
             <pc:docMk/>
             <pc:sldMk cId="1438842662" sldId="450"/>
@@ -1137,12 +1171,36 @@
             <ac:spMk id="29" creationId="{0A54EF9B-865C-E3A5-A4B9-BB4F63065F53}"/>
           </ac:spMkLst>
         </pc:spChg>
+        <pc:picChg chg="add mod">
+          <ac:chgData name="Diekrons MCL" userId="b6f93fc8970d2d55" providerId="LiveId" clId="{3D9846B6-E99C-44D7-8A6F-14EB01E0FCF5}" dt="2022-09-17T17:52:30.581" v="2216" actId="1076"/>
+          <ac:picMkLst>
+            <pc:docMk/>
+            <pc:sldMk cId="1438842662" sldId="450"/>
+            <ac:picMk id="2" creationId="{488E1745-6CB2-2CF4-47CB-0EEB68A22EAD}"/>
+          </ac:picMkLst>
+        </pc:picChg>
         <pc:picChg chg="add del mod">
           <ac:chgData name="Diekrons MCL" userId="b6f93fc8970d2d55" providerId="LiveId" clId="{3D9846B6-E99C-44D7-8A6F-14EB01E0FCF5}" dt="2022-09-11T00:10:29.086" v="2035" actId="478"/>
           <ac:picMkLst>
             <pc:docMk/>
             <pc:sldMk cId="1438842662" sldId="450"/>
             <ac:picMk id="3" creationId="{81130044-06D8-FB2A-FE0A-47AC0C42391D}"/>
+          </ac:picMkLst>
+        </pc:picChg>
+        <pc:picChg chg="add mod">
+          <ac:chgData name="Diekrons MCL" userId="b6f93fc8970d2d55" providerId="LiveId" clId="{3D9846B6-E99C-44D7-8A6F-14EB01E0FCF5}" dt="2022-09-17T17:53:00.696" v="2220" actId="1076"/>
+          <ac:picMkLst>
+            <pc:docMk/>
+            <pc:sldMk cId="1438842662" sldId="450"/>
+            <ac:picMk id="3" creationId="{C57D55EE-A18E-589D-CFC3-038F7E5F1D3F}"/>
+          </ac:picMkLst>
+        </pc:picChg>
+        <pc:picChg chg="add mod">
+          <ac:chgData name="Diekrons MCL" userId="b6f93fc8970d2d55" providerId="LiveId" clId="{3D9846B6-E99C-44D7-8A6F-14EB01E0FCF5}" dt="2022-09-17T17:53:26.713" v="2223" actId="1076"/>
+          <ac:picMkLst>
+            <pc:docMk/>
+            <pc:sldMk cId="1438842662" sldId="450"/>
+            <ac:picMk id="4" creationId="{CC6B0712-B279-1ECD-2D87-C8AC3579B0DE}"/>
           </ac:picMkLst>
         </pc:picChg>
         <pc:picChg chg="del">
@@ -1161,8 +1219,8 @@
             <ac:picMk id="9" creationId="{771A583F-DB23-34C0-C0A4-5364FD1AE53B}"/>
           </ac:picMkLst>
         </pc:picChg>
-        <pc:picChg chg="add mod">
-          <ac:chgData name="Diekrons MCL" userId="b6f93fc8970d2d55" providerId="LiveId" clId="{3D9846B6-E99C-44D7-8A6F-14EB01E0FCF5}" dt="2022-09-11T00:10:38.121" v="2036" actId="1076"/>
+        <pc:picChg chg="add del mod">
+          <ac:chgData name="Diekrons MCL" userId="b6f93fc8970d2d55" providerId="LiveId" clId="{3D9846B6-E99C-44D7-8A6F-14EB01E0FCF5}" dt="2022-09-17T17:51:46.338" v="2211" actId="478"/>
           <ac:picMkLst>
             <pc:docMk/>
             <pc:sldMk cId="1438842662" sldId="450"/>
@@ -1177,6 +1235,13 @@
             <ac:picMk id="37" creationId="{93890A01-DAAF-0025-A195-825C53AB6CBD}"/>
           </ac:picMkLst>
         </pc:picChg>
+      </pc:sldChg>
+      <pc:sldChg chg="add">
+        <pc:chgData name="Diekrons MCL" userId="b6f93fc8970d2d55" providerId="LiveId" clId="{3D9846B6-E99C-44D7-8A6F-14EB01E0FCF5}" dt="2022-09-17T17:51:17.470" v="2210" actId="2890"/>
+        <pc:sldMkLst>
+          <pc:docMk/>
+          <pc:sldMk cId="2173432253" sldId="451"/>
+        </pc:sldMkLst>
       </pc:sldChg>
       <pc:sldMasterChg chg="delSldLayout">
         <pc:chgData name="Diekrons MCL" userId="b6f93fc8970d2d55" providerId="LiveId" clId="{3D9846B6-E99C-44D7-8A6F-14EB01E0FCF5}" dt="2022-09-11T00:14:28.724" v="2198" actId="47"/>
@@ -1304,7 +1369,7 @@
           <a:p>
             <a:fld id="{A57473C6-F235-4D76-8306-F9B8675CC3E3}" type="datetimeFigureOut">
               <a:rPr lang="en-US" smtClean="0"/>
-              <a:t>9/10/2022</a:t>
+              <a:t>9/17/2022</a:t>
             </a:fld>
             <a:endParaRPr lang="en-US"/>
           </a:p>
@@ -1469,7 +1534,7 @@
           <a:p>
             <a:fld id="{1CE25003-6321-498D-BE48-F7CA1ED29012}" type="datetimeFigureOut">
               <a:rPr lang="en-US" smtClean="0"/>
-              <a:t>9/10/2022</a:t>
+              <a:t>9/17/2022</a:t>
             </a:fld>
             <a:endParaRPr lang="en-US"/>
           </a:p>
@@ -2871,6 +2936,174 @@
     <p:extLst>
       <p:ext uri="{BB962C8B-B14F-4D97-AF65-F5344CB8AC3E}">
         <p14:creationId xmlns:p14="http://schemas.microsoft.com/office/powerpoint/2010/main" val="306336319"/>
+      </p:ext>
+    </p:extLst>
+  </p:cSld>
+  <p:clrMapOvr>
+    <a:masterClrMapping/>
+  </p:clrMapOvr>
+</p:notes>
+</file>
+
+<file path=ppt/notesSlides/notesSlide8.xml><?xml version="1.0" encoding="utf-8"?>
+<p:notes xmlns:a="http://schemas.openxmlformats.org/drawingml/2006/main" xmlns:r="http://schemas.openxmlformats.org/officeDocument/2006/relationships" xmlns:p="http://schemas.openxmlformats.org/presentationml/2006/main">
+  <p:cSld>
+    <p:spTree>
+      <p:nvGrpSpPr>
+        <p:cNvPr id="1" name=""/>
+        <p:cNvGrpSpPr/>
+        <p:nvPr/>
+      </p:nvGrpSpPr>
+      <p:grpSpPr>
+        <a:xfrm>
+          <a:off x="0" y="0"/>
+          <a:ext cx="0" cy="0"/>
+          <a:chOff x="0" y="0"/>
+          <a:chExt cx="0" cy="0"/>
+        </a:xfrm>
+      </p:grpSpPr>
+      <p:sp>
+        <p:nvSpPr>
+          <p:cNvPr id="2" name="Slide Image Placeholder 1"/>
+          <p:cNvSpPr>
+            <a:spLocks noGrp="1" noRot="1" noChangeAspect="1"/>
+          </p:cNvSpPr>
+          <p:nvPr>
+            <p:ph type="sldImg"/>
+          </p:nvPr>
+        </p:nvSpPr>
+        <p:spPr/>
+      </p:sp>
+      <p:sp>
+        <p:nvSpPr>
+          <p:cNvPr id="3" name="Notes Placeholder 2"/>
+          <p:cNvSpPr>
+            <a:spLocks noGrp="1"/>
+          </p:cNvSpPr>
+          <p:nvPr>
+            <p:ph type="body" idx="1"/>
+          </p:nvPr>
+        </p:nvSpPr>
+        <p:spPr/>
+        <p:txBody>
+          <a:bodyPr/>
+          <a:lstStyle/>
+          <a:p>
+            <a:pPr marL="0" marR="0" lvl="0" indent="0" algn="l" defTabSz="914400" rtl="0" eaLnBrk="1" fontAlgn="auto" latinLnBrk="0" hangingPunct="1">
+              <a:lnSpc>
+                <a:spcPct val="100000"/>
+              </a:lnSpc>
+              <a:spcBef>
+                <a:spcPts val="0"/>
+              </a:spcBef>
+              <a:spcAft>
+                <a:spcPts val="0"/>
+              </a:spcAft>
+              <a:buClrTx/>
+              <a:buSzTx/>
+              <a:buFontTx/>
+              <a:buNone/>
+              <a:tabLst/>
+              <a:defRPr/>
+            </a:pPr>
+            <a:r>
+              <a:rPr lang="en-US" sz="1200">
+                <a:solidFill>
+                  <a:prstClr val="black"/>
+                </a:solidFill>
+              </a:rPr>
+              <a:t>© Copyright Showeet.com – Creative &amp; Free PowerPoint Templates</a:t>
+            </a:r>
+          </a:p>
+        </p:txBody>
+      </p:sp>
+      <p:sp>
+        <p:nvSpPr>
+          <p:cNvPr id="4" name="Slide Number Placeholder 3"/>
+          <p:cNvSpPr>
+            <a:spLocks noGrp="1"/>
+          </p:cNvSpPr>
+          <p:nvPr>
+            <p:ph type="sldNum" sz="quarter" idx="10"/>
+          </p:nvPr>
+        </p:nvSpPr>
+        <p:spPr/>
+        <p:txBody>
+          <a:bodyPr/>
+          <a:lstStyle/>
+          <a:p>
+            <a:pPr marL="0" marR="0" lvl="0" indent="0" algn="r" defTabSz="914400" rtl="0" eaLnBrk="1" fontAlgn="auto" latinLnBrk="0" hangingPunct="1">
+              <a:lnSpc>
+                <a:spcPct val="100000"/>
+              </a:lnSpc>
+              <a:spcBef>
+                <a:spcPts val="0"/>
+              </a:spcBef>
+              <a:spcAft>
+                <a:spcPts val="0"/>
+              </a:spcAft>
+              <a:buClrTx/>
+              <a:buSzTx/>
+              <a:buFontTx/>
+              <a:buNone/>
+              <a:tabLst/>
+              <a:defRPr/>
+            </a:pPr>
+            <a:fld id="{06BEB3AE-8E34-4534-922B-E380FB565A43}" type="slidenum">
+              <a:rPr kumimoji="0" lang="en-US" sz="1200" b="0" i="0" u="none" strike="noStrike" kern="1200" cap="none" spc="0" normalizeH="0" baseline="0" noProof="0" smtClean="0">
+                <a:ln>
+                  <a:noFill/>
+                </a:ln>
+                <a:solidFill>
+                  <a:prstClr val="black"/>
+                </a:solidFill>
+                <a:effectLst/>
+                <a:uLnTx/>
+                <a:uFillTx/>
+                <a:latin typeface="Calibri" panose="020F0502020204030204"/>
+                <a:ea typeface="+mn-ea"/>
+                <a:cs typeface="+mn-cs"/>
+              </a:rPr>
+              <a:pPr marL="0" marR="0" lvl="0" indent="0" algn="r" defTabSz="914400" rtl="0" eaLnBrk="1" fontAlgn="auto" latinLnBrk="0" hangingPunct="1">
+                <a:lnSpc>
+                  <a:spcPct val="100000"/>
+                </a:lnSpc>
+                <a:spcBef>
+                  <a:spcPts val="0"/>
+                </a:spcBef>
+                <a:spcAft>
+                  <a:spcPts val="0"/>
+                </a:spcAft>
+                <a:buClrTx/>
+                <a:buSzTx/>
+                <a:buFontTx/>
+                <a:buNone/>
+                <a:tabLst/>
+                <a:defRPr/>
+              </a:pPr>
+              <a:t>8</a:t>
+            </a:fld>
+            <a:endParaRPr kumimoji="0" lang="en-US" sz="1200" b="0" i="0" u="none" strike="noStrike" kern="1200" cap="none" spc="0" normalizeH="0" baseline="0" noProof="0">
+              <a:ln>
+                <a:noFill/>
+              </a:ln>
+              <a:solidFill>
+                <a:prstClr val="black"/>
+              </a:solidFill>
+              <a:effectLst/>
+              <a:uLnTx/>
+              <a:uFillTx/>
+              <a:latin typeface="Calibri" panose="020F0502020204030204"/>
+              <a:ea typeface="+mn-ea"/>
+              <a:cs typeface="+mn-cs"/>
+            </a:endParaRPr>
+          </a:p>
+        </p:txBody>
+      </p:sp>
+    </p:spTree>
+    <p:extLst>
+      <p:ext uri="{BB962C8B-B14F-4D97-AF65-F5344CB8AC3E}">
+        <p14:creationId xmlns:p14="http://schemas.microsoft.com/office/powerpoint/2010/main" val="716343828"/>
       </p:ext>
     </p:extLst>
   </p:cSld>
@@ -34362,7 +34595,116 @@
         </p:nvSpPr>
         <p:spPr>
           <a:xfrm>
-            <a:off x="2900025" y="6352538"/>
+            <a:off x="5022453" y="5867139"/>
+            <a:ext cx="3556269" cy="230832"/>
+          </a:xfrm>
+          <a:prstGeom prst="rect">
+            <a:avLst/>
+          </a:prstGeom>
+          <a:solidFill>
+            <a:schemeClr val="bg1"/>
+          </a:solidFill>
+        </p:spPr>
+        <p:txBody>
+          <a:bodyPr wrap="square" rtlCol="0">
+            <a:spAutoFit/>
+          </a:bodyPr>
+          <a:lstStyle/>
+          <a:p>
+            <a:pPr algn="ctr"/>
+            <a:r>
+              <a:rPr lang="en-US" sz="900" b="1" dirty="0">
+                <a:solidFill>
+                  <a:srgbClr val="123C10"/>
+                </a:solidFill>
+                <a:latin typeface="Nunito" pitchFamily="2" charset="0"/>
+              </a:rPr>
+              <a:t>Salary Payment by Location</a:t>
+            </a:r>
+            <a:endParaRPr lang="en-GB" sz="900" b="1" dirty="0">
+              <a:solidFill>
+                <a:srgbClr val="123C10"/>
+              </a:solidFill>
+              <a:latin typeface="Nunito" pitchFamily="2" charset="0"/>
+            </a:endParaRPr>
+          </a:p>
+        </p:txBody>
+      </p:sp>
+      <p:pic>
+        <p:nvPicPr>
+          <p:cNvPr id="41" name="Picture 40">
+            <a:extLst>
+              <a:ext uri="{FF2B5EF4-FFF2-40B4-BE49-F238E27FC236}">
+                <a16:creationId xmlns:a16="http://schemas.microsoft.com/office/drawing/2014/main" id="{FA2AB56E-C7F1-058B-2B16-7E16787AC546}"/>
+              </a:ext>
+            </a:extLst>
+          </p:cNvPr>
+          <p:cNvPicPr>
+            <a:picLocks noChangeAspect="1"/>
+          </p:cNvPicPr>
+          <p:nvPr/>
+        </p:nvPicPr>
+        <p:blipFill>
+          <a:blip r:embed="rId7"/>
+          <a:stretch>
+            <a:fillRect/>
+          </a:stretch>
+        </p:blipFill>
+        <p:spPr>
+          <a:xfrm>
+            <a:off x="521614" y="3744172"/>
+            <a:ext cx="3631634" cy="1957641"/>
+          </a:xfrm>
+          <a:prstGeom prst="rect">
+            <a:avLst/>
+          </a:prstGeom>
+        </p:spPr>
+      </p:pic>
+      <p:pic>
+        <p:nvPicPr>
+          <p:cNvPr id="2" name="Picture 1" descr="Chart, map&#10;&#10;Description automatically generated">
+            <a:extLst>
+              <a:ext uri="{FF2B5EF4-FFF2-40B4-BE49-F238E27FC236}">
+                <a16:creationId xmlns:a16="http://schemas.microsoft.com/office/drawing/2014/main" id="{2FA90880-8090-5BB2-4745-5E3BAA90B1E5}"/>
+              </a:ext>
+            </a:extLst>
+          </p:cNvPr>
+          <p:cNvPicPr>
+            <a:picLocks noChangeAspect="1"/>
+          </p:cNvPicPr>
+          <p:nvPr/>
+        </p:nvPicPr>
+        <p:blipFill>
+          <a:blip r:embed="rId8"/>
+          <a:stretch>
+            <a:fillRect/>
+          </a:stretch>
+        </p:blipFill>
+        <p:spPr>
+          <a:xfrm>
+            <a:off x="5022453" y="3964889"/>
+            <a:ext cx="3571217" cy="1728759"/>
+          </a:xfrm>
+          <a:prstGeom prst="rect">
+            <a:avLst/>
+          </a:prstGeom>
+        </p:spPr>
+      </p:pic>
+      <p:sp>
+        <p:nvSpPr>
+          <p:cNvPr id="3" name="TextBox 2">
+            <a:extLst>
+              <a:ext uri="{FF2B5EF4-FFF2-40B4-BE49-F238E27FC236}">
+                <a16:creationId xmlns:a16="http://schemas.microsoft.com/office/drawing/2014/main" id="{4B299F21-B66D-C3FE-9B78-976ECCF04C9F}"/>
+              </a:ext>
+            </a:extLst>
+          </p:cNvPr>
+          <p:cNvSpPr txBox="1"/>
+          <p:nvPr/>
+        </p:nvSpPr>
+        <p:spPr>
+          <a:xfrm>
+            <a:off x="826059" y="5937541"/>
             <a:ext cx="3556269" cy="230832"/>
           </a:xfrm>
           <a:prstGeom prst="rect">
@@ -34397,36 +34739,6 @@
           </a:p>
         </p:txBody>
       </p:sp>
-      <p:pic>
-        <p:nvPicPr>
-          <p:cNvPr id="41" name="Picture 40">
-            <a:extLst>
-              <a:ext uri="{FF2B5EF4-FFF2-40B4-BE49-F238E27FC236}">
-                <a16:creationId xmlns:a16="http://schemas.microsoft.com/office/drawing/2014/main" id="{FA2AB56E-C7F1-058B-2B16-7E16787AC546}"/>
-              </a:ext>
-            </a:extLst>
-          </p:cNvPr>
-          <p:cNvPicPr>
-            <a:picLocks noChangeAspect="1"/>
-          </p:cNvPicPr>
-          <p:nvPr/>
-        </p:nvPicPr>
-        <p:blipFill>
-          <a:blip r:embed="rId7"/>
-          <a:stretch>
-            <a:fillRect/>
-          </a:stretch>
-        </p:blipFill>
-        <p:spPr>
-          <a:xfrm>
-            <a:off x="2331191" y="3823721"/>
-            <a:ext cx="4691226" cy="2528817"/>
-          </a:xfrm>
-          <a:prstGeom prst="rect">
-            <a:avLst/>
-          </a:prstGeom>
-        </p:spPr>
-      </p:pic>
     </p:spTree>
     <p:extLst>
       <p:ext uri="{BB962C8B-B14F-4D97-AF65-F5344CB8AC3E}">
@@ -34520,6 +34832,560 @@
                 <a:defRPr/>
               </a:pPr>
               <a:t>7</a:t>
+            </a:fld>
+            <a:endParaRPr lang="en-US">
+              <a:solidFill>
+                <a:prstClr val="white"/>
+              </a:solidFill>
+              <a:latin typeface="Calibri" panose="020F0502020204030204"/>
+            </a:endParaRPr>
+          </a:p>
+        </p:txBody>
+      </p:sp>
+      <p:pic>
+        <p:nvPicPr>
+          <p:cNvPr id="11" name="Picture 10">
+            <a:extLst>
+              <a:ext uri="{FF2B5EF4-FFF2-40B4-BE49-F238E27FC236}">
+                <a16:creationId xmlns:a16="http://schemas.microsoft.com/office/drawing/2014/main" id="{D4740D52-4227-5DDD-F466-83F08B4D150D}"/>
+              </a:ext>
+            </a:extLst>
+          </p:cNvPr>
+          <p:cNvPicPr>
+            <a:picLocks noChangeAspect="1"/>
+          </p:cNvPicPr>
+          <p:nvPr/>
+        </p:nvPicPr>
+        <p:blipFill>
+          <a:blip r:embed="rId3"/>
+          <a:stretch>
+            <a:fillRect/>
+          </a:stretch>
+        </p:blipFill>
+        <p:spPr>
+          <a:xfrm>
+            <a:off x="7353050" y="6170204"/>
+            <a:ext cx="1790950" cy="628738"/>
+          </a:xfrm>
+          <a:prstGeom prst="rect">
+            <a:avLst/>
+          </a:prstGeom>
+        </p:spPr>
+      </p:pic>
+      <p:grpSp>
+        <p:nvGrpSpPr>
+          <p:cNvPr id="12" name="Group 11">
+            <a:extLst>
+              <a:ext uri="{FF2B5EF4-FFF2-40B4-BE49-F238E27FC236}">
+                <a16:creationId xmlns:a16="http://schemas.microsoft.com/office/drawing/2014/main" id="{3FA58470-5019-A9C9-3F8F-B93476AA790F}"/>
+              </a:ext>
+            </a:extLst>
+          </p:cNvPr>
+          <p:cNvGrpSpPr/>
+          <p:nvPr/>
+        </p:nvGrpSpPr>
+        <p:grpSpPr>
+          <a:xfrm>
+            <a:off x="431643" y="6170204"/>
+            <a:ext cx="1448274" cy="480310"/>
+            <a:chOff x="3095329" y="1896765"/>
+            <a:chExt cx="2163891" cy="800999"/>
+          </a:xfrm>
+        </p:grpSpPr>
+        <p:sp>
+          <p:nvSpPr>
+            <p:cNvPr id="13" name="Rectangle 12">
+              <a:extLst>
+                <a:ext uri="{FF2B5EF4-FFF2-40B4-BE49-F238E27FC236}">
+                  <a16:creationId xmlns:a16="http://schemas.microsoft.com/office/drawing/2014/main" id="{EB749FCF-E3BB-B018-0D52-FD2BD3F63D36}"/>
+                </a:ext>
+              </a:extLst>
+            </p:cNvPr>
+            <p:cNvSpPr/>
+            <p:nvPr/>
+          </p:nvSpPr>
+          <p:spPr>
+            <a:xfrm>
+              <a:off x="3095329" y="1896765"/>
+              <a:ext cx="2163891" cy="800999"/>
+            </a:xfrm>
+            <a:prstGeom prst="rect">
+              <a:avLst/>
+            </a:prstGeom>
+          </p:spPr>
+          <p:style>
+            <a:lnRef idx="2">
+              <a:schemeClr val="dk1">
+                <a:shade val="50000"/>
+              </a:schemeClr>
+            </a:lnRef>
+            <a:fillRef idx="1">
+              <a:schemeClr val="dk1"/>
+            </a:fillRef>
+            <a:effectRef idx="0">
+              <a:schemeClr val="dk1"/>
+            </a:effectRef>
+            <a:fontRef idx="minor">
+              <a:schemeClr val="lt1"/>
+            </a:fontRef>
+          </p:style>
+          <p:txBody>
+            <a:bodyPr rtlCol="0" anchor="ctr"/>
+            <a:lstStyle/>
+            <a:p>
+              <a:pPr algn="ctr"/>
+              <a:endParaRPr lang="en-GB"/>
+            </a:p>
+          </p:txBody>
+        </p:sp>
+        <p:pic>
+          <p:nvPicPr>
+            <p:cNvPr id="14" name="Picture 13" descr="Logo, company name&#10;&#10;Description automatically generated">
+              <a:extLst>
+                <a:ext uri="{FF2B5EF4-FFF2-40B4-BE49-F238E27FC236}">
+                  <a16:creationId xmlns:a16="http://schemas.microsoft.com/office/drawing/2014/main" id="{860E7306-2B01-6081-3D0D-3D1A369FE709}"/>
+                </a:ext>
+              </a:extLst>
+            </p:cNvPr>
+            <p:cNvPicPr>
+              <a:picLocks noChangeAspect="1"/>
+            </p:cNvPicPr>
+            <p:nvPr/>
+          </p:nvPicPr>
+          <p:blipFill>
+            <a:blip r:embed="rId4">
+              <a:extLst>
+                <a:ext uri="{28A0092B-C50C-407E-A947-70E740481C1C}">
+                  <a14:useLocalDpi xmlns:a14="http://schemas.microsoft.com/office/drawing/2010/main" val="0"/>
+                </a:ext>
+              </a:extLst>
+            </a:blip>
+            <a:stretch>
+              <a:fillRect/>
+            </a:stretch>
+          </p:blipFill>
+          <p:spPr>
+            <a:xfrm>
+              <a:off x="3280787" y="1988841"/>
+              <a:ext cx="1900885" cy="596949"/>
+            </a:xfrm>
+            <a:prstGeom prst="rect">
+              <a:avLst/>
+            </a:prstGeom>
+          </p:spPr>
+        </p:pic>
+      </p:grpSp>
+      <p:sp>
+        <p:nvSpPr>
+          <p:cNvPr id="16" name="TextBox 15">
+            <a:extLst>
+              <a:ext uri="{FF2B5EF4-FFF2-40B4-BE49-F238E27FC236}">
+                <a16:creationId xmlns:a16="http://schemas.microsoft.com/office/drawing/2014/main" id="{F7E2494D-021F-10BE-C31A-19DCFCB4EF5B}"/>
+              </a:ext>
+            </a:extLst>
+          </p:cNvPr>
+          <p:cNvSpPr txBox="1"/>
+          <p:nvPr/>
+        </p:nvSpPr>
+        <p:spPr>
+          <a:xfrm>
+            <a:off x="487987" y="3029001"/>
+            <a:ext cx="3556269" cy="230832"/>
+          </a:xfrm>
+          <a:prstGeom prst="rect">
+            <a:avLst/>
+          </a:prstGeom>
+          <a:solidFill>
+            <a:schemeClr val="bg1"/>
+          </a:solidFill>
+        </p:spPr>
+        <p:txBody>
+          <a:bodyPr wrap="square" rtlCol="0">
+            <a:spAutoFit/>
+          </a:bodyPr>
+          <a:lstStyle/>
+          <a:p>
+            <a:pPr algn="ctr"/>
+            <a:r>
+              <a:rPr lang="en-US" sz="900" b="1" dirty="0">
+                <a:solidFill>
+                  <a:srgbClr val="123C10"/>
+                </a:solidFill>
+                <a:latin typeface="Nunito" pitchFamily="2" charset="0"/>
+              </a:rPr>
+              <a:t>Salary Payment Trend</a:t>
+            </a:r>
+            <a:endParaRPr lang="en-GB" sz="900" b="1" dirty="0">
+              <a:solidFill>
+                <a:srgbClr val="123C10"/>
+              </a:solidFill>
+              <a:latin typeface="Nunito" pitchFamily="2" charset="0"/>
+            </a:endParaRPr>
+          </a:p>
+        </p:txBody>
+      </p:sp>
+      <p:sp>
+        <p:nvSpPr>
+          <p:cNvPr id="21" name="TextBox 20">
+            <a:extLst>
+              <a:ext uri="{FF2B5EF4-FFF2-40B4-BE49-F238E27FC236}">
+                <a16:creationId xmlns:a16="http://schemas.microsoft.com/office/drawing/2014/main" id="{C41C1B62-EB42-2150-44DC-E90B3B7DDAB2}"/>
+              </a:ext>
+            </a:extLst>
+          </p:cNvPr>
+          <p:cNvSpPr txBox="1"/>
+          <p:nvPr/>
+        </p:nvSpPr>
+        <p:spPr>
+          <a:xfrm>
+            <a:off x="5178773" y="3573972"/>
+            <a:ext cx="2976060" cy="1615827"/>
+          </a:xfrm>
+          <a:prstGeom prst="rect">
+            <a:avLst/>
+          </a:prstGeom>
+          <a:noFill/>
+        </p:spPr>
+        <p:txBody>
+          <a:bodyPr wrap="square">
+            <a:spAutoFit/>
+          </a:bodyPr>
+          <a:lstStyle/>
+          <a:p>
+            <a:pPr algn="ctr"/>
+            <a:r>
+              <a:rPr lang="en-GB" sz="1100" b="1" dirty="0">
+                <a:latin typeface="Nunito" pitchFamily="2" charset="0"/>
+              </a:rPr>
+              <a:t>Trend patterns for each type of transaction by the customers:</a:t>
+            </a:r>
+          </a:p>
+          <a:p>
+            <a:pPr algn="ctr"/>
+            <a:endParaRPr lang="en-GB" sz="1100" dirty="0">
+              <a:latin typeface="Nunito" pitchFamily="2" charset="0"/>
+            </a:endParaRPr>
+          </a:p>
+          <a:p>
+            <a:r>
+              <a:rPr lang="en-GB" sz="1100" dirty="0">
+                <a:latin typeface="Nunito" pitchFamily="2" charset="0"/>
+              </a:rPr>
+              <a:t>a) Purchase at merchants (debits)</a:t>
+            </a:r>
+          </a:p>
+          <a:p>
+            <a:pPr algn="ctr"/>
+            <a:r>
+              <a:rPr lang="en-GB" sz="1100" dirty="0">
+                <a:latin typeface="Nunito" pitchFamily="2" charset="0"/>
+              </a:rPr>
+              <a:t>b) Bills and other payments not done with merchants (debits)</a:t>
+            </a:r>
+          </a:p>
+          <a:p>
+            <a:r>
+              <a:rPr lang="en-GB" sz="1100" dirty="0">
+                <a:latin typeface="Nunito" pitchFamily="2" charset="0"/>
+              </a:rPr>
+              <a:t>c) Salary payments received (credits)</a:t>
+            </a:r>
+          </a:p>
+          <a:p>
+            <a:pPr algn="ctr"/>
+            <a:endParaRPr lang="en-GB" sz="1100" dirty="0">
+              <a:latin typeface="Nunito" pitchFamily="2" charset="0"/>
+            </a:endParaRPr>
+          </a:p>
+          <a:p>
+            <a:pPr algn="ctr"/>
+            <a:endParaRPr lang="en-GB" sz="1100" dirty="0">
+              <a:latin typeface="Nunito" pitchFamily="2" charset="0"/>
+            </a:endParaRPr>
+          </a:p>
+        </p:txBody>
+      </p:sp>
+      <p:pic>
+        <p:nvPicPr>
+          <p:cNvPr id="2" name="Picture 1" descr="Chart, scatter chart&#10;&#10;Description automatically generated">
+            <a:extLst>
+              <a:ext uri="{FF2B5EF4-FFF2-40B4-BE49-F238E27FC236}">
+                <a16:creationId xmlns:a16="http://schemas.microsoft.com/office/drawing/2014/main" id="{488E1745-6CB2-2CF4-47CB-0EEB68A22EAD}"/>
+              </a:ext>
+            </a:extLst>
+          </p:cNvPr>
+          <p:cNvPicPr>
+            <a:picLocks noChangeAspect="1"/>
+          </p:cNvPicPr>
+          <p:nvPr/>
+        </p:nvPicPr>
+        <p:blipFill>
+          <a:blip r:embed="rId5"/>
+          <a:stretch>
+            <a:fillRect/>
+          </a:stretch>
+        </p:blipFill>
+        <p:spPr>
+          <a:xfrm>
+            <a:off x="555768" y="1322528"/>
+            <a:ext cx="3546191" cy="1618518"/>
+          </a:xfrm>
+          <a:prstGeom prst="rect">
+            <a:avLst/>
+          </a:prstGeom>
+        </p:spPr>
+      </p:pic>
+      <p:pic>
+        <p:nvPicPr>
+          <p:cNvPr id="3" name="Picture 2" descr="Chart, scatter chart&#10;&#10;Description automatically generated">
+            <a:extLst>
+              <a:ext uri="{FF2B5EF4-FFF2-40B4-BE49-F238E27FC236}">
+                <a16:creationId xmlns:a16="http://schemas.microsoft.com/office/drawing/2014/main" id="{C57D55EE-A18E-589D-CFC3-038F7E5F1D3F}"/>
+              </a:ext>
+            </a:extLst>
+          </p:cNvPr>
+          <p:cNvPicPr>
+            <a:picLocks noChangeAspect="1"/>
+          </p:cNvPicPr>
+          <p:nvPr/>
+        </p:nvPicPr>
+        <p:blipFill>
+          <a:blip r:embed="rId6"/>
+          <a:stretch>
+            <a:fillRect/>
+          </a:stretch>
+        </p:blipFill>
+        <p:spPr>
+          <a:xfrm>
+            <a:off x="4860235" y="1348618"/>
+            <a:ext cx="3499546" cy="1603585"/>
+          </a:xfrm>
+          <a:prstGeom prst="rect">
+            <a:avLst/>
+          </a:prstGeom>
+        </p:spPr>
+      </p:pic>
+      <p:pic>
+        <p:nvPicPr>
+          <p:cNvPr id="4" name="Picture 3" descr="Chart, scatter chart&#10;&#10;Description automatically generated">
+            <a:extLst>
+              <a:ext uri="{FF2B5EF4-FFF2-40B4-BE49-F238E27FC236}">
+                <a16:creationId xmlns:a16="http://schemas.microsoft.com/office/drawing/2014/main" id="{CC6B0712-B279-1ECD-2D87-C8AC3579B0DE}"/>
+              </a:ext>
+            </a:extLst>
+          </p:cNvPr>
+          <p:cNvPicPr>
+            <a:picLocks noChangeAspect="1"/>
+          </p:cNvPicPr>
+          <p:nvPr/>
+        </p:nvPicPr>
+        <p:blipFill>
+          <a:blip r:embed="rId7"/>
+          <a:stretch>
+            <a:fillRect/>
+          </a:stretch>
+        </p:blipFill>
+        <p:spPr>
+          <a:xfrm>
+            <a:off x="310275" y="3347788"/>
+            <a:ext cx="4037175" cy="1849078"/>
+          </a:xfrm>
+          <a:prstGeom prst="rect">
+            <a:avLst/>
+          </a:prstGeom>
+        </p:spPr>
+      </p:pic>
+      <p:sp>
+        <p:nvSpPr>
+          <p:cNvPr id="5" name="TextBox 4">
+            <a:extLst>
+              <a:ext uri="{FF2B5EF4-FFF2-40B4-BE49-F238E27FC236}">
+                <a16:creationId xmlns:a16="http://schemas.microsoft.com/office/drawing/2014/main" id="{6C6A7D5A-F389-F12B-90FB-488765BA5CDC}"/>
+              </a:ext>
+            </a:extLst>
+          </p:cNvPr>
+          <p:cNvSpPr txBox="1"/>
+          <p:nvPr/>
+        </p:nvSpPr>
+        <p:spPr>
+          <a:xfrm>
+            <a:off x="362091" y="5344493"/>
+            <a:ext cx="3556269" cy="230832"/>
+          </a:xfrm>
+          <a:prstGeom prst="rect">
+            <a:avLst/>
+          </a:prstGeom>
+          <a:solidFill>
+            <a:schemeClr val="bg1"/>
+          </a:solidFill>
+        </p:spPr>
+        <p:txBody>
+          <a:bodyPr wrap="square" rtlCol="0">
+            <a:spAutoFit/>
+          </a:bodyPr>
+          <a:lstStyle/>
+          <a:p>
+            <a:pPr algn="ctr"/>
+            <a:r>
+              <a:rPr lang="en-US" sz="900" b="1" dirty="0">
+                <a:solidFill>
+                  <a:srgbClr val="123C10"/>
+                </a:solidFill>
+                <a:latin typeface="Nunito" pitchFamily="2" charset="0"/>
+              </a:rPr>
+              <a:t>Non-Merchant Purchases/Bills Trend</a:t>
+            </a:r>
+            <a:endParaRPr lang="en-GB" sz="900" b="1" dirty="0">
+              <a:solidFill>
+                <a:srgbClr val="123C10"/>
+              </a:solidFill>
+              <a:latin typeface="Nunito" pitchFamily="2" charset="0"/>
+            </a:endParaRPr>
+          </a:p>
+        </p:txBody>
+      </p:sp>
+      <p:sp>
+        <p:nvSpPr>
+          <p:cNvPr id="9" name="TextBox 8">
+            <a:extLst>
+              <a:ext uri="{FF2B5EF4-FFF2-40B4-BE49-F238E27FC236}">
+                <a16:creationId xmlns:a16="http://schemas.microsoft.com/office/drawing/2014/main" id="{5403F228-96D6-BE77-1B7F-80DA58A5C160}"/>
+              </a:ext>
+            </a:extLst>
+          </p:cNvPr>
+          <p:cNvSpPr txBox="1"/>
+          <p:nvPr/>
+        </p:nvSpPr>
+        <p:spPr>
+          <a:xfrm>
+            <a:off x="4688595" y="3065985"/>
+            <a:ext cx="3556269" cy="230832"/>
+          </a:xfrm>
+          <a:prstGeom prst="rect">
+            <a:avLst/>
+          </a:prstGeom>
+          <a:solidFill>
+            <a:schemeClr val="bg1"/>
+          </a:solidFill>
+        </p:spPr>
+        <p:txBody>
+          <a:bodyPr wrap="square" rtlCol="0">
+            <a:spAutoFit/>
+          </a:bodyPr>
+          <a:lstStyle/>
+          <a:p>
+            <a:pPr algn="ctr"/>
+            <a:r>
+              <a:rPr lang="en-US" sz="900" b="1" dirty="0">
+                <a:solidFill>
+                  <a:srgbClr val="123C10"/>
+                </a:solidFill>
+                <a:latin typeface="Nunito" pitchFamily="2" charset="0"/>
+              </a:rPr>
+              <a:t>Merchant Purchases Trend</a:t>
+            </a:r>
+            <a:endParaRPr lang="en-GB" sz="900" b="1" dirty="0">
+              <a:solidFill>
+                <a:srgbClr val="123C10"/>
+              </a:solidFill>
+              <a:latin typeface="Nunito" pitchFamily="2" charset="0"/>
+            </a:endParaRPr>
+          </a:p>
+        </p:txBody>
+      </p:sp>
+    </p:spTree>
+    <p:extLst>
+      <p:ext uri="{BB962C8B-B14F-4D97-AF65-F5344CB8AC3E}">
+        <p14:creationId xmlns:p14="http://schemas.microsoft.com/office/powerpoint/2010/main" val="1438842662"/>
+      </p:ext>
+    </p:extLst>
+  </p:cSld>
+  <p:clrMapOvr>
+    <a:masterClrMapping/>
+  </p:clrMapOvr>
+</p:sld>
+</file>
+
+<file path=ppt/slides/slide8.xml><?xml version="1.0" encoding="utf-8"?>
+<p:sld xmlns:a="http://schemas.openxmlformats.org/drawingml/2006/main" xmlns:r="http://schemas.openxmlformats.org/officeDocument/2006/relationships" xmlns:p="http://schemas.openxmlformats.org/presentationml/2006/main">
+  <p:cSld>
+    <p:spTree>
+      <p:nvGrpSpPr>
+        <p:cNvPr id="1" name=""/>
+        <p:cNvGrpSpPr/>
+        <p:nvPr/>
+      </p:nvGrpSpPr>
+      <p:grpSpPr>
+        <a:xfrm>
+          <a:off x="0" y="0"/>
+          <a:ext cx="0" cy="0"/>
+          <a:chOff x="0" y="0"/>
+          <a:chExt cx="0" cy="0"/>
+        </a:xfrm>
+      </p:grpSpPr>
+      <p:sp>
+        <p:nvSpPr>
+          <p:cNvPr id="7" name="Title 6"/>
+          <p:cNvSpPr>
+            <a:spLocks noGrp="1"/>
+          </p:cNvSpPr>
+          <p:nvPr>
+            <p:ph type="title"/>
+          </p:nvPr>
+        </p:nvSpPr>
+        <p:spPr>
+          <a:xfrm>
+            <a:off x="628650" y="240785"/>
+            <a:ext cx="7886700" cy="1132235"/>
+          </a:xfrm>
+        </p:spPr>
+        <p:txBody>
+          <a:bodyPr>
+            <a:noAutofit/>
+          </a:bodyPr>
+          <a:lstStyle/>
+          <a:p>
+            <a:r>
+              <a:rPr lang="en-US" dirty="0">
+                <a:solidFill>
+                  <a:srgbClr val="123C10"/>
+                </a:solidFill>
+                <a:latin typeface="Nunito" pitchFamily="2" charset="0"/>
+              </a:rPr>
+              <a:t>Insights….</a:t>
+            </a:r>
+          </a:p>
+        </p:txBody>
+      </p:sp>
+      <p:sp>
+        <p:nvSpPr>
+          <p:cNvPr id="6" name="Slide Number Placeholder 5"/>
+          <p:cNvSpPr>
+            <a:spLocks noGrp="1"/>
+          </p:cNvSpPr>
+          <p:nvPr>
+            <p:ph type="sldNum" sz="quarter" idx="12"/>
+          </p:nvPr>
+        </p:nvSpPr>
+        <p:spPr/>
+        <p:txBody>
+          <a:bodyPr/>
+          <a:lstStyle/>
+          <a:p>
+            <a:pPr defTabSz="685800">
+              <a:defRPr/>
+            </a:pPr>
+            <a:fld id="{7CD08052-46D4-4451-BCD3-D01F8058DAE8}" type="slidenum">
+              <a:rPr lang="en-US">
+                <a:solidFill>
+                  <a:prstClr val="white"/>
+                </a:solidFill>
+                <a:latin typeface="Calibri" panose="020F0502020204030204"/>
+              </a:rPr>
+              <a:pPr defTabSz="685800">
+                <a:defRPr/>
+              </a:pPr>
+              <a:t>8</a:t>
             </a:fld>
             <a:endParaRPr lang="en-US">
               <a:solidFill>
@@ -34887,7 +35753,7 @@
     </p:spTree>
     <p:extLst>
       <p:ext uri="{BB962C8B-B14F-4D97-AF65-F5344CB8AC3E}">
-        <p14:creationId xmlns:p14="http://schemas.microsoft.com/office/powerpoint/2010/main" val="1438842662"/>
+        <p14:creationId xmlns:p14="http://schemas.microsoft.com/office/powerpoint/2010/main" val="2173432253"/>
       </p:ext>
     </p:extLst>
   </p:cSld>

</xml_diff>